<commit_message>
Some plots don't work. Recharge sometimes
</commit_message>
<xml_diff>
--- a/Working/HW12_WatershedModel/str_package.pptx
+++ b/Working/HW12_WatershedModel/str_package.pptx
@@ -285,7 +285,7 @@
           <a:p>
             <a:fld id="{36DBD233-0917-484E-ADEA-6BB5DA0FBA71}" type="datetimeFigureOut">
               <a:rPr lang="en-US" smtClean="0"/>
-              <a:t>4/11/22</a:t>
+              <a:t>4/19/2022</a:t>
             </a:fld>
             <a:endParaRPr lang="en-US"/>
           </a:p>
@@ -483,7 +483,7 @@
           <a:p>
             <a:fld id="{36DBD233-0917-484E-ADEA-6BB5DA0FBA71}" type="datetimeFigureOut">
               <a:rPr lang="en-US" smtClean="0"/>
-              <a:t>4/11/22</a:t>
+              <a:t>4/19/2022</a:t>
             </a:fld>
             <a:endParaRPr lang="en-US"/>
           </a:p>
@@ -691,7 +691,7 @@
           <a:p>
             <a:fld id="{36DBD233-0917-484E-ADEA-6BB5DA0FBA71}" type="datetimeFigureOut">
               <a:rPr lang="en-US" smtClean="0"/>
-              <a:t>4/11/22</a:t>
+              <a:t>4/19/2022</a:t>
             </a:fld>
             <a:endParaRPr lang="en-US"/>
           </a:p>
@@ -889,7 +889,7 @@
           <a:p>
             <a:fld id="{36DBD233-0917-484E-ADEA-6BB5DA0FBA71}" type="datetimeFigureOut">
               <a:rPr lang="en-US" smtClean="0"/>
-              <a:t>4/11/22</a:t>
+              <a:t>4/19/2022</a:t>
             </a:fld>
             <a:endParaRPr lang="en-US"/>
           </a:p>
@@ -1164,7 +1164,7 @@
           <a:p>
             <a:fld id="{36DBD233-0917-484E-ADEA-6BB5DA0FBA71}" type="datetimeFigureOut">
               <a:rPr lang="en-US" smtClean="0"/>
-              <a:t>4/11/22</a:t>
+              <a:t>4/19/2022</a:t>
             </a:fld>
             <a:endParaRPr lang="en-US"/>
           </a:p>
@@ -1429,7 +1429,7 @@
           <a:p>
             <a:fld id="{36DBD233-0917-484E-ADEA-6BB5DA0FBA71}" type="datetimeFigureOut">
               <a:rPr lang="en-US" smtClean="0"/>
-              <a:t>4/11/22</a:t>
+              <a:t>4/19/2022</a:t>
             </a:fld>
             <a:endParaRPr lang="en-US"/>
           </a:p>
@@ -1841,7 +1841,7 @@
           <a:p>
             <a:fld id="{36DBD233-0917-484E-ADEA-6BB5DA0FBA71}" type="datetimeFigureOut">
               <a:rPr lang="en-US" smtClean="0"/>
-              <a:t>4/11/22</a:t>
+              <a:t>4/19/2022</a:t>
             </a:fld>
             <a:endParaRPr lang="en-US"/>
           </a:p>
@@ -1982,7 +1982,7 @@
           <a:p>
             <a:fld id="{36DBD233-0917-484E-ADEA-6BB5DA0FBA71}" type="datetimeFigureOut">
               <a:rPr lang="en-US" smtClean="0"/>
-              <a:t>4/11/22</a:t>
+              <a:t>4/19/2022</a:t>
             </a:fld>
             <a:endParaRPr lang="en-US"/>
           </a:p>
@@ -2095,7 +2095,7 @@
           <a:p>
             <a:fld id="{36DBD233-0917-484E-ADEA-6BB5DA0FBA71}" type="datetimeFigureOut">
               <a:rPr lang="en-US" smtClean="0"/>
-              <a:t>4/11/22</a:t>
+              <a:t>4/19/2022</a:t>
             </a:fld>
             <a:endParaRPr lang="en-US"/>
           </a:p>
@@ -2406,7 +2406,7 @@
           <a:p>
             <a:fld id="{36DBD233-0917-484E-ADEA-6BB5DA0FBA71}" type="datetimeFigureOut">
               <a:rPr lang="en-US" smtClean="0"/>
-              <a:t>4/11/22</a:t>
+              <a:t>4/19/2022</a:t>
             </a:fld>
             <a:endParaRPr lang="en-US"/>
           </a:p>
@@ -2694,7 +2694,7 @@
           <a:p>
             <a:fld id="{36DBD233-0917-484E-ADEA-6BB5DA0FBA71}" type="datetimeFigureOut">
               <a:rPr lang="en-US" smtClean="0"/>
-              <a:t>4/11/22</a:t>
+              <a:t>4/19/2022</a:t>
             </a:fld>
             <a:endParaRPr lang="en-US"/>
           </a:p>
@@ -2935,7 +2935,7 @@
           <a:p>
             <a:fld id="{36DBD233-0917-484E-ADEA-6BB5DA0FBA71}" type="datetimeFigureOut">
               <a:rPr lang="en-US" smtClean="0"/>
-              <a:t>4/11/22</a:t>
+              <a:t>4/19/2022</a:t>
             </a:fld>
             <a:endParaRPr lang="en-US"/>
           </a:p>
@@ -3678,8 +3678,8 @@
         </p:nvSpPr>
         <p:spPr>
           <a:xfrm>
-            <a:off x="366862" y="950463"/>
-            <a:ext cx="5385833" cy="6386913"/>
+            <a:off x="366862" y="1027416"/>
+            <a:ext cx="5385833" cy="5529124"/>
           </a:xfrm>
         </p:spPr>
         <p:txBody>
@@ -4558,7 +4558,7 @@
             </a:r>
             <a:r>
               <a:rPr lang="en-US" sz="1600" dirty="0"/>
-              <a:t>/2, 1, x+1, </a:t>
+              <a:t>/2, 1, y+1, </a:t>
             </a:r>
             <a:r>
               <a:rPr lang="en-US" sz="1600" dirty="0">
@@ -5224,7 +5224,7 @@
         </p:nvSpPr>
         <p:spPr>
           <a:xfrm>
-            <a:off x="704192" y="1408386"/>
+            <a:off x="367886" y="956323"/>
             <a:ext cx="10699531" cy="4719146"/>
           </a:xfrm>
         </p:spPr>
@@ -5264,6 +5264,98 @@
                   <a:srgbClr val="7030A0"/>
                 </a:solidFill>
               </a:rPr>
+              <a:t>The maximum tributes you can have is 10</a:t>
+            </a:r>
+          </a:p>
+          <a:p>
+            <a:pPr marL="0" indent="0">
+              <a:lnSpc>
+                <a:spcPct val="120000"/>
+              </a:lnSpc>
+              <a:spcBef>
+                <a:spcPts val="0"/>
+              </a:spcBef>
+              <a:buNone/>
+            </a:pPr>
+            <a:r>
+              <a:rPr lang="en-US" sz="1800" dirty="0" err="1">
+                <a:solidFill>
+                  <a:srgbClr val="7030A0"/>
+                </a:solidFill>
+              </a:rPr>
+              <a:t>nseg</a:t>
+            </a:r>
+            <a:r>
+              <a:rPr lang="en-US" sz="1800" dirty="0">
+                <a:solidFill>
+                  <a:srgbClr val="7030A0"/>
+                </a:solidFill>
+              </a:rPr>
+              <a:t> = 3</a:t>
+            </a:r>
+          </a:p>
+          <a:p>
+            <a:pPr marL="0" indent="0">
+              <a:lnSpc>
+                <a:spcPct val="120000"/>
+              </a:lnSpc>
+              <a:spcBef>
+                <a:spcPts val="0"/>
+              </a:spcBef>
+              <a:buNone/>
+            </a:pPr>
+            <a:r>
+              <a:rPr lang="en-US" sz="1800" dirty="0" err="1">
+                <a:solidFill>
+                  <a:srgbClr val="7030A0"/>
+                </a:solidFill>
+              </a:rPr>
+              <a:t>ntrib</a:t>
+            </a:r>
+            <a:r>
+              <a:rPr lang="en-US" sz="1800" dirty="0">
+                <a:solidFill>
+                  <a:srgbClr val="7030A0"/>
+                </a:solidFill>
+              </a:rPr>
+              <a:t> = 2</a:t>
+            </a:r>
+          </a:p>
+          <a:p>
+            <a:pPr marL="0" indent="0">
+              <a:lnSpc>
+                <a:spcPct val="120000"/>
+              </a:lnSpc>
+              <a:spcBef>
+                <a:spcPts val="0"/>
+              </a:spcBef>
+              <a:buNone/>
+            </a:pPr>
+            <a:r>
+              <a:rPr lang="en-US" sz="1800" dirty="0">
+                <a:solidFill>
+                  <a:srgbClr val="7030A0"/>
+                </a:solidFill>
+              </a:rPr>
+              <a:t>Stage = 0.5</a:t>
+            </a:r>
+          </a:p>
+          <a:p>
+            <a:pPr marL="0" indent="0">
+              <a:lnSpc>
+                <a:spcPct val="120000"/>
+              </a:lnSpc>
+              <a:spcBef>
+                <a:spcPts val="0"/>
+              </a:spcBef>
+              <a:buNone/>
+            </a:pPr>
+            <a:r>
+              <a:rPr lang="en-US" sz="1800" dirty="0">
+                <a:solidFill>
+                  <a:srgbClr val="7030A0"/>
+                </a:solidFill>
+              </a:rPr>
               <a:t>slope</a:t>
             </a:r>
             <a:r>
@@ -5494,7 +5586,15 @@
             </a:r>
             <a:r>
               <a:rPr lang="en-US" sz="1800" dirty="0"/>
-              <a:t> = 10  </a:t>
+              <a:t> = 1.36*</a:t>
+            </a:r>
+            <a:r>
+              <a:rPr lang="en-US" sz="1800" dirty="0" err="1"/>
+              <a:t>K_horiz</a:t>
+            </a:r>
+            <a:r>
+              <a:rPr lang="en-US" sz="1800" dirty="0"/>
+              <a:t>  </a:t>
             </a:r>
             <a:r>
               <a:rPr lang="en-US" sz="1800" dirty="0">
@@ -5672,7 +5772,7 @@
         </p:nvSpPr>
         <p:spPr>
           <a:xfrm>
-            <a:off x="367886" y="950463"/>
+            <a:off x="220728" y="796351"/>
             <a:ext cx="11750542" cy="5523909"/>
           </a:xfrm>
           <a:prstGeom prst="rect">
@@ -6158,7 +6258,7 @@
                   <a:schemeClr val="accent1"/>
                 </a:solidFill>
               </a:rPr>
-              <a:t># inflow to seg2 = return from town</a:t>
+              <a:t># inflow to seg2 = return from town. </a:t>
             </a:r>
           </a:p>
           <a:p>
@@ -6374,11 +6474,14 @@
               </a:spcBef>
               <a:buNone/>
             </a:pPr>
-            <a:endParaRPr lang="en-US" sz="1600" dirty="0">
-              <a:solidFill>
-                <a:schemeClr val="accent1"/>
-              </a:solidFill>
-            </a:endParaRPr>
+            <a:r>
+              <a:rPr lang="en-US" sz="1600" dirty="0">
+                <a:solidFill>
+                  <a:schemeClr val="accent1"/>
+                </a:solidFill>
+              </a:rPr>
+              <a:t>#Segment[25+1]=3</a:t>
+            </a:r>
           </a:p>
           <a:p>
             <a:pPr marL="0" indent="0">
@@ -7221,7 +7324,19 @@
             </a:r>
             <a:r>
               <a:rPr lang="en-US" sz="1600" dirty="0"/>
-              <a:t> = Stop + stage      </a:t>
+              <a:t> = Stop + </a:t>
+            </a:r>
+            <a:r>
+              <a:rPr lang="en-US" sz="1600" dirty="0">
+                <a:highlight>
+                  <a:srgbClr val="FFFF00"/>
+                </a:highlight>
+              </a:rPr>
+              <a:t>stage</a:t>
+            </a:r>
+            <a:r>
+              <a:rPr lang="en-US" sz="1600" dirty="0"/>
+              <a:t>      </a:t>
             </a:r>
             <a:r>
               <a:rPr lang="en-US" sz="1600" dirty="0">
@@ -7732,7 +7847,37 @@
             </a:r>
             <a:r>
               <a:rPr lang="en-US" sz="1800" dirty="0"/>
-              <a:t>[r], Stop[r],    		width,  slope, rough]</a:t>
+              <a:t>[r], Stop[r],    		width,  slope, rough] </a:t>
+            </a:r>
+            <a:r>
+              <a:rPr lang="en-US" sz="1800" dirty="0">
+                <a:solidFill>
+                  <a:schemeClr val="accent6">
+                    <a:lumMod val="75000"/>
+                  </a:schemeClr>
+                </a:solidFill>
+              </a:rPr>
+              <a:t>#this order can not be modified inside the dictionary because that is how </a:t>
+            </a:r>
+            <a:r>
+              <a:rPr lang="en-US" sz="1800" dirty="0" err="1">
+                <a:solidFill>
+                  <a:schemeClr val="accent6">
+                    <a:lumMod val="75000"/>
+                  </a:schemeClr>
+                </a:solidFill>
+              </a:rPr>
+              <a:t>flopy</a:t>
+            </a:r>
+            <a:r>
+              <a:rPr lang="en-US" sz="1800" dirty="0">
+                <a:solidFill>
+                  <a:schemeClr val="accent6">
+                    <a:lumMod val="75000"/>
+                  </a:schemeClr>
+                </a:solidFill>
+              </a:rPr>
+              <a:t> uses them</a:t>
             </a:r>
           </a:p>
           <a:p>
@@ -7826,19 +7971,19 @@
               <a:buNone/>
             </a:pPr>
             <a:r>
-              <a:rPr lang="en-US" sz="1800" dirty="0" err="1"/>
+              <a:rPr lang="en-US" sz="1800" strike="sngStrike" dirty="0" err="1"/>
               <a:t>seg_info</a:t>
             </a:r>
             <a:r>
-              <a:rPr lang="en-US" sz="1800" dirty="0"/>
+              <a:rPr lang="en-US" sz="1800" strike="sngStrike" dirty="0"/>
               <a:t> = </a:t>
             </a:r>
             <a:r>
-              <a:rPr lang="en-US" sz="1800" dirty="0" err="1"/>
+              <a:rPr lang="en-US" sz="1800" strike="sngStrike" dirty="0" err="1"/>
               <a:t>np.zeros</a:t>
             </a:r>
             <a:r>
-              <a:rPr lang="en-US" sz="1800" dirty="0"/>
+              <a:rPr lang="en-US" sz="1800" strike="sngStrike" dirty="0"/>
               <a:t>((10,nseg))</a:t>
             </a:r>
           </a:p>

</xml_diff>